<commit_message>
Update developer guide diagrams
</commit_message>
<xml_diff>
--- a/docs/diagrams/Diagrams.pptx
+++ b/docs/diagrams/Diagrams.pptx
@@ -216,7 +216,7 @@
           <a:p>
             <a:fld id="{F5CC4B3F-88C1-4FFA-B1B6-F41C21DC6924}" type="datetimeFigureOut">
               <a:rPr lang="en-US" smtClean="0"/>
-              <a:t>10/12/16</a:t>
+              <a:t>11/6/16</a:t>
             </a:fld>
             <a:endParaRPr lang="en-US" dirty="0"/>
           </a:p>
@@ -665,7 +665,7 @@
           <a:p>
             <a:fld id="{78C97017-6FC3-485B-9764-EAC9E56C1D49}" type="datetimeFigureOut">
               <a:rPr lang="en-US" smtClean="0"/>
-              <a:t>10/12/16</a:t>
+              <a:t>11/6/16</a:t>
             </a:fld>
             <a:endParaRPr lang="en-US" dirty="0"/>
           </a:p>
@@ -835,7 +835,7 @@
           <a:p>
             <a:fld id="{78C97017-6FC3-485B-9764-EAC9E56C1D49}" type="datetimeFigureOut">
               <a:rPr lang="en-US" smtClean="0"/>
-              <a:t>10/12/16</a:t>
+              <a:t>11/6/16</a:t>
             </a:fld>
             <a:endParaRPr lang="en-US" dirty="0"/>
           </a:p>
@@ -1015,7 +1015,7 @@
           <a:p>
             <a:fld id="{78C97017-6FC3-485B-9764-EAC9E56C1D49}" type="datetimeFigureOut">
               <a:rPr lang="en-US" smtClean="0"/>
-              <a:t>10/12/16</a:t>
+              <a:t>11/6/16</a:t>
             </a:fld>
             <a:endParaRPr lang="en-US" dirty="0"/>
           </a:p>
@@ -1185,7 +1185,7 @@
           <a:p>
             <a:fld id="{78C97017-6FC3-485B-9764-EAC9E56C1D49}" type="datetimeFigureOut">
               <a:rPr lang="en-US" smtClean="0"/>
-              <a:t>10/12/16</a:t>
+              <a:t>11/6/16</a:t>
             </a:fld>
             <a:endParaRPr lang="en-US" dirty="0"/>
           </a:p>
@@ -1431,7 +1431,7 @@
           <a:p>
             <a:fld id="{78C97017-6FC3-485B-9764-EAC9E56C1D49}" type="datetimeFigureOut">
               <a:rPr lang="en-US" smtClean="0"/>
-              <a:t>10/12/16</a:t>
+              <a:t>11/6/16</a:t>
             </a:fld>
             <a:endParaRPr lang="en-US" dirty="0"/>
           </a:p>
@@ -1719,7 +1719,7 @@
           <a:p>
             <a:fld id="{78C97017-6FC3-485B-9764-EAC9E56C1D49}" type="datetimeFigureOut">
               <a:rPr lang="en-US" smtClean="0"/>
-              <a:t>10/12/16</a:t>
+              <a:t>11/6/16</a:t>
             </a:fld>
             <a:endParaRPr lang="en-US" dirty="0"/>
           </a:p>
@@ -2141,7 +2141,7 @@
           <a:p>
             <a:fld id="{78C97017-6FC3-485B-9764-EAC9E56C1D49}" type="datetimeFigureOut">
               <a:rPr lang="en-US" smtClean="0"/>
-              <a:t>10/12/16</a:t>
+              <a:t>11/6/16</a:t>
             </a:fld>
             <a:endParaRPr lang="en-US" dirty="0"/>
           </a:p>
@@ -2259,7 +2259,7 @@
           <a:p>
             <a:fld id="{78C97017-6FC3-485B-9764-EAC9E56C1D49}" type="datetimeFigureOut">
               <a:rPr lang="en-US" smtClean="0"/>
-              <a:t>10/12/16</a:t>
+              <a:t>11/6/16</a:t>
             </a:fld>
             <a:endParaRPr lang="en-US" dirty="0"/>
           </a:p>
@@ -2354,7 +2354,7 @@
           <a:p>
             <a:fld id="{78C97017-6FC3-485B-9764-EAC9E56C1D49}" type="datetimeFigureOut">
               <a:rPr lang="en-US" smtClean="0"/>
-              <a:t>10/12/16</a:t>
+              <a:t>11/6/16</a:t>
             </a:fld>
             <a:endParaRPr lang="en-US" dirty="0"/>
           </a:p>
@@ -2631,7 +2631,7 @@
           <a:p>
             <a:fld id="{78C97017-6FC3-485B-9764-EAC9E56C1D49}" type="datetimeFigureOut">
               <a:rPr lang="en-US" smtClean="0"/>
-              <a:t>10/12/16</a:t>
+              <a:t>11/6/16</a:t>
             </a:fld>
             <a:endParaRPr lang="en-US" dirty="0"/>
           </a:p>
@@ -2884,7 +2884,7 @@
           <a:p>
             <a:fld id="{78C97017-6FC3-485B-9764-EAC9E56C1D49}" type="datetimeFigureOut">
               <a:rPr lang="en-US" smtClean="0"/>
-              <a:t>10/12/16</a:t>
+              <a:t>11/6/16</a:t>
             </a:fld>
             <a:endParaRPr lang="en-US" dirty="0"/>
           </a:p>
@@ -3097,7 +3097,7 @@
           <a:p>
             <a:fld id="{78C97017-6FC3-485B-9764-EAC9E56C1D49}" type="datetimeFigureOut">
               <a:rPr lang="en-US" smtClean="0"/>
-              <a:t>10/12/16</a:t>
+              <a:t>11/6/16</a:t>
             </a:fld>
             <a:endParaRPr lang="en-US" dirty="0"/>
           </a:p>
@@ -4276,101 +4276,6 @@
       </p:sp>
       <p:sp>
         <p:nvSpPr>
-          <p:cNvPr id="51" name="Cloud 50"/>
-          <p:cNvSpPr/>
-          <p:nvPr/>
-        </p:nvSpPr>
-        <p:spPr>
-          <a:xfrm>
-            <a:off x="2650069" y="1447800"/>
-            <a:ext cx="914400" cy="533400"/>
-          </a:xfrm>
-          <a:prstGeom prst="cloud">
-            <a:avLst/>
-          </a:prstGeom>
-          <a:solidFill>
-            <a:schemeClr val="bg1"/>
-          </a:solidFill>
-          <a:ln>
-            <a:solidFill>
-              <a:schemeClr val="tx1"/>
-            </a:solidFill>
-          </a:ln>
-        </p:spPr>
-        <p:style>
-          <a:lnRef idx="2">
-            <a:schemeClr val="accent1">
-              <a:shade val="50000"/>
-            </a:schemeClr>
-          </a:lnRef>
-          <a:fillRef idx="1">
-            <a:schemeClr val="accent1"/>
-          </a:fillRef>
-          <a:effectRef idx="0">
-            <a:schemeClr val="accent1"/>
-          </a:effectRef>
-          <a:fontRef idx="minor">
-            <a:schemeClr val="lt1"/>
-          </a:fontRef>
-        </p:style>
-        <p:txBody>
-          <a:bodyPr rtlCol="0" anchor="ctr"/>
-          <a:lstStyle/>
-          <a:p>
-            <a:pPr algn="ctr"/>
-            <a:r>
-              <a:rPr lang="en-US" sz="1400" dirty="0">
-                <a:solidFill>
-                  <a:schemeClr val="tx1"/>
-                </a:solidFill>
-              </a:rPr>
-              <a:t>Web</a:t>
-            </a:r>
-          </a:p>
-        </p:txBody>
-      </p:sp>
-      <p:cxnSp>
-        <p:nvCxnSpPr>
-          <p:cNvPr id="52" name="Elbow Connector 51"/>
-          <p:cNvCxnSpPr>
-            <a:stCxn id="2" idx="0"/>
-            <a:endCxn id="51" idx="2"/>
-          </p:cNvCxnSpPr>
-          <p:nvPr/>
-        </p:nvCxnSpPr>
-        <p:spPr>
-          <a:xfrm rot="5400000" flipH="1" flipV="1">
-            <a:off x="2222648" y="1760922"/>
-            <a:ext cx="476678" cy="383835"/>
-          </a:xfrm>
-          <a:prstGeom prst="bentConnector2">
-            <a:avLst/>
-          </a:prstGeom>
-          <a:ln w="28575">
-            <a:solidFill>
-              <a:srgbClr val="00B050"/>
-            </a:solidFill>
-            <a:prstDash val="sysDot"/>
-            <a:tailEnd type="arrow"/>
-          </a:ln>
-        </p:spPr>
-        <p:style>
-          <a:lnRef idx="1">
-            <a:schemeClr val="accent1"/>
-          </a:lnRef>
-          <a:fillRef idx="0">
-            <a:schemeClr val="accent1"/>
-          </a:fillRef>
-          <a:effectRef idx="0">
-            <a:schemeClr val="accent1"/>
-          </a:effectRef>
-          <a:fontRef idx="minor">
-            <a:schemeClr val="tx1"/>
-          </a:fontRef>
-        </p:style>
-      </p:cxnSp>
-      <p:sp>
-        <p:nvSpPr>
           <p:cNvPr id="23" name="Rectangle 62"/>
           <p:cNvSpPr/>
           <p:nvPr/>
@@ -13542,48 +13447,6 @@
       </p:sp>
       <p:cxnSp>
         <p:nvCxnSpPr>
-          <p:cNvPr id="55" name="Straight Arrow Connector 54"/>
-          <p:cNvCxnSpPr>
-            <a:stCxn id="62" idx="0"/>
-            <a:endCxn id="67" idx="2"/>
-          </p:cNvCxnSpPr>
-          <p:nvPr/>
-        </p:nvCxnSpPr>
-        <p:spPr>
-          <a:xfrm flipV="1">
-            <a:off x="6667770" y="2632344"/>
-            <a:ext cx="1612" cy="225722"/>
-          </a:xfrm>
-          <a:prstGeom prst="straightConnector1">
-            <a:avLst/>
-          </a:prstGeom>
-          <a:ln w="19050">
-            <a:solidFill>
-              <a:srgbClr val="7030A0"/>
-            </a:solidFill>
-            <a:prstDash val="sysDot"/>
-            <a:headEnd type="none" w="med" len="med"/>
-            <a:tailEnd type="arrow" w="med" len="med"/>
-          </a:ln>
-          <a:effectLst/>
-        </p:spPr>
-        <p:style>
-          <a:lnRef idx="1">
-            <a:schemeClr val="accent2"/>
-          </a:lnRef>
-          <a:fillRef idx="2">
-            <a:schemeClr val="accent2"/>
-          </a:fillRef>
-          <a:effectRef idx="1">
-            <a:schemeClr val="accent2"/>
-          </a:effectRef>
-          <a:fontRef idx="minor">
-            <a:schemeClr val="dk1"/>
-          </a:fontRef>
-        </p:style>
-      </p:cxnSp>
-      <p:cxnSp>
-        <p:nvCxnSpPr>
           <p:cNvPr id="58" name="Straight Arrow Connector 57"/>
           <p:cNvCxnSpPr>
             <a:stCxn id="42" idx="3"/>
@@ -14001,168 +13864,22 @@
           </a:p>
         </p:txBody>
       </p:sp>
-      <p:sp>
-        <p:nvSpPr>
-          <p:cNvPr id="51" name="Flowchart: Decision 96"/>
-          <p:cNvSpPr/>
-          <p:nvPr/>
-        </p:nvSpPr>
-        <p:spPr>
-          <a:xfrm>
-            <a:off x="3984303" y="2673991"/>
-            <a:ext cx="236048" cy="173380"/>
-          </a:xfrm>
-          <a:prstGeom prst="flowChartDecision">
-            <a:avLst/>
-          </a:prstGeom>
-          <a:solidFill>
-            <a:srgbClr val="7030A0"/>
-          </a:solidFill>
-          <a:ln w="19050">
-            <a:solidFill>
-              <a:srgbClr val="7030A0"/>
-            </a:solidFill>
-          </a:ln>
-          <a:effectLst/>
-        </p:spPr>
-        <p:style>
-          <a:lnRef idx="1">
-            <a:schemeClr val="accent6"/>
-          </a:lnRef>
-          <a:fillRef idx="2">
-            <a:schemeClr val="accent6"/>
-          </a:fillRef>
-          <a:effectRef idx="1">
-            <a:schemeClr val="accent6"/>
-          </a:effectRef>
-          <a:fontRef idx="minor">
-            <a:schemeClr val="dk1"/>
-          </a:fontRef>
-        </p:style>
-        <p:txBody>
-          <a:bodyPr rtlCol="0" anchor="ctr"/>
-          <a:lstStyle/>
-          <a:p>
-            <a:pPr algn="ctr"/>
-            <a:endParaRPr lang="en-US" sz="1050" dirty="0"/>
-          </a:p>
-        </p:txBody>
-      </p:sp>
       <p:cxnSp>
         <p:nvCxnSpPr>
           <p:cNvPr id="30" name="Elbow Connector 29"/>
           <p:cNvCxnSpPr>
-            <a:stCxn id="51" idx="3"/>
+            <a:stCxn id="46" idx="3"/>
             <a:endCxn id="49" idx="1"/>
           </p:cNvCxnSpPr>
           <p:nvPr/>
         </p:nvCxnSpPr>
         <p:spPr>
           <a:xfrm>
-            <a:off x="4220351" y="2760681"/>
-            <a:ext cx="266666" cy="260070"/>
+            <a:off x="3973125" y="2800800"/>
+            <a:ext cx="513892" cy="219951"/>
           </a:xfrm>
           <a:prstGeom prst="bentConnector3">
             <a:avLst/>
-          </a:prstGeom>
-          <a:ln w="19050">
-            <a:solidFill>
-              <a:srgbClr val="7030A0"/>
-            </a:solidFill>
-            <a:headEnd type="none" w="med" len="med"/>
-            <a:tailEnd type="arrow" w="med" len="med"/>
-          </a:ln>
-          <a:effectLst/>
-        </p:spPr>
-        <p:style>
-          <a:lnRef idx="1">
-            <a:schemeClr val="accent2"/>
-          </a:lnRef>
-          <a:fillRef idx="2">
-            <a:schemeClr val="accent2"/>
-          </a:fillRef>
-          <a:effectRef idx="1">
-            <a:schemeClr val="accent2"/>
-          </a:effectRef>
-          <a:fontRef idx="minor">
-            <a:schemeClr val="dk1"/>
-          </a:fontRef>
-        </p:style>
-      </p:cxnSp>
-      <p:sp>
-        <p:nvSpPr>
-          <p:cNvPr id="57" name="Rectangle 8"/>
-          <p:cNvSpPr/>
-          <p:nvPr/>
-        </p:nvSpPr>
-        <p:spPr>
-          <a:xfrm>
-            <a:off x="4503204" y="2280569"/>
-            <a:ext cx="1156969" cy="346760"/>
-          </a:xfrm>
-          <a:prstGeom prst="rect">
-            <a:avLst/>
-          </a:prstGeom>
-          <a:ln w="19050">
-            <a:solidFill>
-              <a:srgbClr val="7030A0"/>
-            </a:solidFill>
-          </a:ln>
-          <a:effectLst/>
-        </p:spPr>
-        <p:style>
-          <a:lnRef idx="1">
-            <a:schemeClr val="accent4"/>
-          </a:lnRef>
-          <a:fillRef idx="2">
-            <a:schemeClr val="accent4"/>
-          </a:fillRef>
-          <a:effectRef idx="1">
-            <a:schemeClr val="accent4"/>
-          </a:effectRef>
-          <a:fontRef idx="minor">
-            <a:schemeClr val="dk1"/>
-          </a:fontRef>
-        </p:style>
-        <p:txBody>
-          <a:bodyPr rtlCol="0" anchor="ctr"/>
-          <a:lstStyle/>
-          <a:p>
-            <a:pPr algn="ctr"/>
-            <a:r>
-              <a:rPr lang="en-US" sz="1050" dirty="0" smtClean="0">
-                <a:solidFill>
-                  <a:srgbClr val="7030A0"/>
-                </a:solidFill>
-              </a:rPr>
-              <a:t>UniqueTagList</a:t>
-            </a:r>
-            <a:endParaRPr lang="en-SG" sz="1050" dirty="0">
-              <a:solidFill>
-                <a:srgbClr val="7030A0"/>
-              </a:solidFill>
-            </a:endParaRPr>
-          </a:p>
-        </p:txBody>
-      </p:sp>
-      <p:cxnSp>
-        <p:nvCxnSpPr>
-          <p:cNvPr id="59" name="Elbow Connector 58"/>
-          <p:cNvCxnSpPr>
-            <a:stCxn id="51" idx="3"/>
-            <a:endCxn id="57" idx="1"/>
-          </p:cNvCxnSpPr>
-          <p:nvPr/>
-        </p:nvCxnSpPr>
-        <p:spPr>
-          <a:xfrm flipV="1">
-            <a:off x="4220351" y="2453949"/>
-            <a:ext cx="282853" cy="306732"/>
-          </a:xfrm>
-          <a:prstGeom prst="bentConnector3">
-            <a:avLst>
-              <a:gd name="adj1" fmla="val 50000"/>
-            </a:avLst>
           </a:prstGeom>
           <a:ln w="19050">
             <a:solidFill>
@@ -14338,7 +14055,7 @@
         </p:nvSpPr>
         <p:spPr>
           <a:xfrm>
-            <a:off x="6315289" y="2285584"/>
+            <a:off x="7599244" y="2671179"/>
             <a:ext cx="708186" cy="346760"/>
           </a:xfrm>
           <a:prstGeom prst="rect">
@@ -14376,7 +14093,7 @@
                   <a:srgbClr val="7030A0"/>
                 </a:solidFill>
               </a:rPr>
-              <a:t>Tag</a:t>
+              <a:t>Status</a:t>
             </a:r>
             <a:endParaRPr lang="en-SG" sz="1050" dirty="0">
               <a:solidFill>
@@ -14386,92 +14103,6 @@
           </a:p>
         </p:txBody>
       </p:sp>
-      <p:sp>
-        <p:nvSpPr>
-          <p:cNvPr id="68" name="Flowchart: Decision 96"/>
-          <p:cNvSpPr/>
-          <p:nvPr/>
-        </p:nvSpPr>
-        <p:spPr>
-          <a:xfrm>
-            <a:off x="5672547" y="2371497"/>
-            <a:ext cx="236048" cy="173380"/>
-          </a:xfrm>
-          <a:prstGeom prst="flowChartDecision">
-            <a:avLst/>
-          </a:prstGeom>
-          <a:noFill/>
-          <a:ln w="19050">
-            <a:solidFill>
-              <a:srgbClr val="7030A0"/>
-            </a:solidFill>
-          </a:ln>
-          <a:effectLst/>
-        </p:spPr>
-        <p:style>
-          <a:lnRef idx="1">
-            <a:schemeClr val="accent6"/>
-          </a:lnRef>
-          <a:fillRef idx="2">
-            <a:schemeClr val="accent6"/>
-          </a:fillRef>
-          <a:effectRef idx="1">
-            <a:schemeClr val="accent6"/>
-          </a:effectRef>
-          <a:fontRef idx="minor">
-            <a:schemeClr val="dk1"/>
-          </a:fontRef>
-        </p:style>
-        <p:txBody>
-          <a:bodyPr rtlCol="0" anchor="ctr"/>
-          <a:lstStyle/>
-          <a:p>
-            <a:pPr algn="ctr"/>
-            <a:endParaRPr lang="en-US" sz="1050" dirty="0"/>
-          </a:p>
-        </p:txBody>
-      </p:sp>
-      <p:cxnSp>
-        <p:nvCxnSpPr>
-          <p:cNvPr id="69" name="Elbow Connector 68"/>
-          <p:cNvCxnSpPr>
-            <a:stCxn id="68" idx="3"/>
-            <a:endCxn id="67" idx="1"/>
-          </p:cNvCxnSpPr>
-          <p:nvPr/>
-        </p:nvCxnSpPr>
-        <p:spPr>
-          <a:xfrm>
-            <a:off x="5908595" y="2458187"/>
-            <a:ext cx="406694" cy="777"/>
-          </a:xfrm>
-          <a:prstGeom prst="bentConnector3">
-            <a:avLst/>
-          </a:prstGeom>
-          <a:ln w="19050">
-            <a:solidFill>
-              <a:srgbClr val="7030A0"/>
-            </a:solidFill>
-            <a:headEnd type="none" w="med" len="med"/>
-            <a:tailEnd type="arrow" w="med" len="med"/>
-          </a:ln>
-          <a:effectLst/>
-        </p:spPr>
-        <p:style>
-          <a:lnRef idx="1">
-            <a:schemeClr val="accent2"/>
-          </a:lnRef>
-          <a:fillRef idx="2">
-            <a:schemeClr val="accent2"/>
-          </a:fillRef>
-          <a:effectRef idx="1">
-            <a:schemeClr val="accent2"/>
-          </a:effectRef>
-          <a:fontRef idx="minor">
-            <a:schemeClr val="dk1"/>
-          </a:fontRef>
-        </p:style>
-      </p:cxnSp>
       <p:sp>
         <p:nvSpPr>
           <p:cNvPr id="72" name="Rectangle 8"/>
@@ -14538,310 +14169,6 @@
           </a:p>
         </p:txBody>
       </p:sp>
-      <p:sp>
-        <p:nvSpPr>
-          <p:cNvPr id="76" name="Rectangle 8"/>
-          <p:cNvSpPr/>
-          <p:nvPr/>
-        </p:nvSpPr>
-        <p:spPr>
-          <a:xfrm>
-            <a:off x="7644166" y="2452661"/>
-            <a:ext cx="914400" cy="335421"/>
-          </a:xfrm>
-          <a:prstGeom prst="rect">
-            <a:avLst/>
-          </a:prstGeom>
-          <a:ln w="19050">
-            <a:solidFill>
-              <a:srgbClr val="7030A0"/>
-            </a:solidFill>
-          </a:ln>
-          <a:effectLst/>
-        </p:spPr>
-        <p:style>
-          <a:lnRef idx="1">
-            <a:schemeClr val="accent4"/>
-          </a:lnRef>
-          <a:fillRef idx="2">
-            <a:schemeClr val="accent4"/>
-          </a:fillRef>
-          <a:effectRef idx="1">
-            <a:schemeClr val="accent4"/>
-          </a:effectRef>
-          <a:fontRef idx="minor">
-            <a:schemeClr val="dk1"/>
-          </a:fontRef>
-        </p:style>
-        <p:txBody>
-          <a:bodyPr rtlCol="0" anchor="ctr"/>
-          <a:lstStyle/>
-          <a:p>
-            <a:pPr algn="ctr"/>
-            <a:r>
-              <a:rPr lang="en-US" sz="1050" dirty="0" smtClean="0">
-                <a:solidFill>
-                  <a:srgbClr val="7030A0"/>
-                </a:solidFill>
-              </a:rPr>
-              <a:t>Floating</a:t>
-            </a:r>
-          </a:p>
-          <a:p>
-            <a:pPr algn="ctr"/>
-            <a:r>
-              <a:rPr lang="en-US" sz="1050" dirty="0" smtClean="0">
-                <a:solidFill>
-                  <a:srgbClr val="7030A0"/>
-                </a:solidFill>
-              </a:rPr>
-              <a:t>Activity</a:t>
-            </a:r>
-            <a:endParaRPr lang="en-SG" sz="1050" dirty="0">
-              <a:solidFill>
-                <a:srgbClr val="7030A0"/>
-              </a:solidFill>
-            </a:endParaRPr>
-          </a:p>
-        </p:txBody>
-      </p:sp>
-      <p:cxnSp>
-        <p:nvCxnSpPr>
-          <p:cNvPr id="79" name="Elbow Connector 78"/>
-          <p:cNvCxnSpPr/>
-          <p:nvPr/>
-        </p:nvCxnSpPr>
-        <p:spPr>
-          <a:xfrm flipV="1">
-            <a:off x="7209764" y="2721391"/>
-            <a:ext cx="434402" cy="327761"/>
-          </a:xfrm>
-          <a:prstGeom prst="bentConnector3">
-            <a:avLst/>
-          </a:prstGeom>
-          <a:ln w="19050">
-            <a:solidFill>
-              <a:srgbClr val="7030A0"/>
-            </a:solidFill>
-            <a:headEnd type="none" w="med" len="med"/>
-            <a:tailEnd type="none" w="med" len="med"/>
-          </a:ln>
-          <a:effectLst/>
-        </p:spPr>
-        <p:style>
-          <a:lnRef idx="1">
-            <a:schemeClr val="accent2"/>
-          </a:lnRef>
-          <a:fillRef idx="2">
-            <a:schemeClr val="accent2"/>
-          </a:fillRef>
-          <a:effectRef idx="1">
-            <a:schemeClr val="accent2"/>
-          </a:effectRef>
-          <a:fontRef idx="minor">
-            <a:schemeClr val="dk1"/>
-          </a:fontRef>
-        </p:style>
-      </p:cxnSp>
-      <p:sp>
-        <p:nvSpPr>
-          <p:cNvPr id="80" name="Rectangle 8"/>
-          <p:cNvSpPr/>
-          <p:nvPr/>
-        </p:nvSpPr>
-        <p:spPr>
-          <a:xfrm>
-            <a:off x="7644166" y="2870415"/>
-            <a:ext cx="914400" cy="344246"/>
-          </a:xfrm>
-          <a:prstGeom prst="rect">
-            <a:avLst/>
-          </a:prstGeom>
-          <a:ln w="19050">
-            <a:solidFill>
-              <a:srgbClr val="7030A0"/>
-            </a:solidFill>
-          </a:ln>
-          <a:effectLst/>
-        </p:spPr>
-        <p:style>
-          <a:lnRef idx="1">
-            <a:schemeClr val="accent4"/>
-          </a:lnRef>
-          <a:fillRef idx="2">
-            <a:schemeClr val="accent4"/>
-          </a:fillRef>
-          <a:effectRef idx="1">
-            <a:schemeClr val="accent4"/>
-          </a:effectRef>
-          <a:fontRef idx="minor">
-            <a:schemeClr val="dk1"/>
-          </a:fontRef>
-        </p:style>
-        <p:txBody>
-          <a:bodyPr rtlCol="0" anchor="ctr"/>
-          <a:lstStyle/>
-          <a:p>
-            <a:pPr algn="ctr"/>
-            <a:r>
-              <a:rPr lang="en-US" sz="1050" dirty="0" smtClean="0">
-                <a:solidFill>
-                  <a:srgbClr val="7030A0"/>
-                </a:solidFill>
-              </a:rPr>
-              <a:t>Deadline</a:t>
-            </a:r>
-          </a:p>
-          <a:p>
-            <a:pPr algn="ctr"/>
-            <a:r>
-              <a:rPr lang="en-US" sz="1050" dirty="0" smtClean="0">
-                <a:solidFill>
-                  <a:srgbClr val="7030A0"/>
-                </a:solidFill>
-              </a:rPr>
-              <a:t>Activity</a:t>
-            </a:r>
-            <a:endParaRPr lang="en-SG" sz="1050" dirty="0">
-              <a:solidFill>
-                <a:srgbClr val="7030A0"/>
-              </a:solidFill>
-            </a:endParaRPr>
-          </a:p>
-        </p:txBody>
-      </p:sp>
-      <p:cxnSp>
-        <p:nvCxnSpPr>
-          <p:cNvPr id="81" name="Elbow Connector 80"/>
-          <p:cNvCxnSpPr/>
-          <p:nvPr/>
-        </p:nvCxnSpPr>
-        <p:spPr>
-          <a:xfrm flipV="1">
-            <a:off x="7209764" y="3044369"/>
-            <a:ext cx="434402" cy="4783"/>
-          </a:xfrm>
-          <a:prstGeom prst="bentConnector3">
-            <a:avLst/>
-          </a:prstGeom>
-          <a:ln w="19050">
-            <a:solidFill>
-              <a:srgbClr val="7030A0"/>
-            </a:solidFill>
-            <a:headEnd type="none" w="med" len="med"/>
-            <a:tailEnd type="none" w="med" len="med"/>
-          </a:ln>
-          <a:effectLst/>
-        </p:spPr>
-        <p:style>
-          <a:lnRef idx="1">
-            <a:schemeClr val="accent2"/>
-          </a:lnRef>
-          <a:fillRef idx="2">
-            <a:schemeClr val="accent2"/>
-          </a:fillRef>
-          <a:effectRef idx="1">
-            <a:schemeClr val="accent2"/>
-          </a:effectRef>
-          <a:fontRef idx="minor">
-            <a:schemeClr val="dk1"/>
-          </a:fontRef>
-        </p:style>
-      </p:cxnSp>
-      <p:sp>
-        <p:nvSpPr>
-          <p:cNvPr id="83" name="Rectangle 8"/>
-          <p:cNvSpPr/>
-          <p:nvPr/>
-        </p:nvSpPr>
-        <p:spPr>
-          <a:xfrm>
-            <a:off x="7644166" y="3300084"/>
-            <a:ext cx="914400" cy="295577"/>
-          </a:xfrm>
-          <a:prstGeom prst="rect">
-            <a:avLst/>
-          </a:prstGeom>
-          <a:ln w="19050">
-            <a:solidFill>
-              <a:srgbClr val="7030A0"/>
-            </a:solidFill>
-          </a:ln>
-          <a:effectLst/>
-        </p:spPr>
-        <p:style>
-          <a:lnRef idx="1">
-            <a:schemeClr val="accent4"/>
-          </a:lnRef>
-          <a:fillRef idx="2">
-            <a:schemeClr val="accent4"/>
-          </a:fillRef>
-          <a:effectRef idx="1">
-            <a:schemeClr val="accent4"/>
-          </a:effectRef>
-          <a:fontRef idx="minor">
-            <a:schemeClr val="dk1"/>
-          </a:fontRef>
-        </p:style>
-        <p:txBody>
-          <a:bodyPr rtlCol="0" anchor="ctr"/>
-          <a:lstStyle/>
-          <a:p>
-            <a:pPr algn="ctr"/>
-            <a:r>
-              <a:rPr lang="en-US" sz="1050" dirty="0" smtClean="0">
-                <a:solidFill>
-                  <a:srgbClr val="7030A0"/>
-                </a:solidFill>
-              </a:rPr>
-              <a:t>EventActivity</a:t>
-            </a:r>
-            <a:endParaRPr lang="en-SG" sz="1050" dirty="0">
-              <a:solidFill>
-                <a:srgbClr val="7030A0"/>
-              </a:solidFill>
-            </a:endParaRPr>
-          </a:p>
-        </p:txBody>
-      </p:sp>
-      <p:cxnSp>
-        <p:nvCxnSpPr>
-          <p:cNvPr id="84" name="Elbow Connector 83"/>
-          <p:cNvCxnSpPr/>
-          <p:nvPr/>
-        </p:nvCxnSpPr>
-        <p:spPr>
-          <a:xfrm>
-            <a:off x="7209764" y="3049152"/>
-            <a:ext cx="434402" cy="318195"/>
-          </a:xfrm>
-          <a:prstGeom prst="bentConnector3">
-            <a:avLst/>
-          </a:prstGeom>
-          <a:ln w="19050">
-            <a:solidFill>
-              <a:srgbClr val="7030A0"/>
-            </a:solidFill>
-            <a:headEnd type="none" w="med" len="med"/>
-            <a:tailEnd type="none" w="med" len="med"/>
-          </a:ln>
-          <a:effectLst/>
-        </p:spPr>
-        <p:style>
-          <a:lnRef idx="1">
-            <a:schemeClr val="accent2"/>
-          </a:lnRef>
-          <a:fillRef idx="2">
-            <a:schemeClr val="accent2"/>
-          </a:fillRef>
-          <a:effectRef idx="1">
-            <a:schemeClr val="accent2"/>
-          </a:effectRef>
-          <a:fontRef idx="minor">
-            <a:schemeClr val="dk1"/>
-          </a:fontRef>
-        </p:style>
-      </p:cxnSp>
       <p:cxnSp>
         <p:nvCxnSpPr>
           <p:cNvPr id="97" name="Elbow Connector 63"/>
@@ -15166,23 +14493,139 @@
       </p:cxnSp>
       <p:sp>
         <p:nvSpPr>
-          <p:cNvPr id="50" name="Isosceles Triangle 102"/>
+          <p:cNvPr id="44" name="Flowchart: Decision 96"/>
           <p:cNvSpPr/>
           <p:nvPr/>
         </p:nvSpPr>
         <p:spPr>
-          <a:xfrm rot="5400000" flipV="1">
-            <a:off x="6987076" y="2957352"/>
-            <a:ext cx="270504" cy="175523"/>
-          </a:xfrm>
-          <a:prstGeom prst="triangle">
-            <a:avLst/>
-          </a:prstGeom>
-          <a:solidFill>
-            <a:srgbClr val="7030A0">
-              <a:alpha val="0"/>
-            </a:srgbClr>
-          </a:solidFill>
+          <a:xfrm>
+            <a:off x="7021863" y="2943979"/>
+            <a:ext cx="236048" cy="173380"/>
+          </a:xfrm>
+          <a:prstGeom prst="flowChartDecision">
+            <a:avLst/>
+          </a:prstGeom>
+          <a:noFill/>
+          <a:ln w="19050">
+            <a:solidFill>
+              <a:srgbClr val="7030A0"/>
+            </a:solidFill>
+          </a:ln>
+          <a:effectLst/>
+        </p:spPr>
+        <p:style>
+          <a:lnRef idx="1">
+            <a:schemeClr val="accent6"/>
+          </a:lnRef>
+          <a:fillRef idx="2">
+            <a:schemeClr val="accent6"/>
+          </a:fillRef>
+          <a:effectRef idx="1">
+            <a:schemeClr val="accent6"/>
+          </a:effectRef>
+          <a:fontRef idx="minor">
+            <a:schemeClr val="dk1"/>
+          </a:fontRef>
+        </p:style>
+        <p:txBody>
+          <a:bodyPr rtlCol="0" anchor="ctr"/>
+          <a:lstStyle/>
+          <a:p>
+            <a:pPr algn="ctr"/>
+            <a:endParaRPr lang="en-US" sz="1050" dirty="0"/>
+          </a:p>
+        </p:txBody>
+      </p:sp>
+      <p:cxnSp>
+        <p:nvCxnSpPr>
+          <p:cNvPr id="45" name="Elbow Connector 44"/>
+          <p:cNvCxnSpPr/>
+          <p:nvPr/>
+        </p:nvCxnSpPr>
+        <p:spPr>
+          <a:xfrm>
+            <a:off x="7250964" y="3036294"/>
+            <a:ext cx="348280" cy="203552"/>
+          </a:xfrm>
+          <a:prstGeom prst="bentConnector3">
+            <a:avLst/>
+          </a:prstGeom>
+          <a:ln w="19050">
+            <a:solidFill>
+              <a:srgbClr val="7030A0"/>
+            </a:solidFill>
+            <a:headEnd type="none" w="med" len="med"/>
+            <a:tailEnd type="arrow" w="med" len="med"/>
+          </a:ln>
+          <a:effectLst/>
+        </p:spPr>
+        <p:style>
+          <a:lnRef idx="1">
+            <a:schemeClr val="accent2"/>
+          </a:lnRef>
+          <a:fillRef idx="2">
+            <a:schemeClr val="accent2"/>
+          </a:fillRef>
+          <a:effectRef idx="1">
+            <a:schemeClr val="accent2"/>
+          </a:effectRef>
+          <a:fontRef idx="minor">
+            <a:schemeClr val="dk1"/>
+          </a:fontRef>
+        </p:style>
+      </p:cxnSp>
+      <p:cxnSp>
+        <p:nvCxnSpPr>
+          <p:cNvPr id="52" name="Elbow Connector 51"/>
+          <p:cNvCxnSpPr/>
+          <p:nvPr/>
+        </p:nvCxnSpPr>
+        <p:spPr>
+          <a:xfrm flipV="1">
+            <a:off x="7261781" y="2847371"/>
+            <a:ext cx="327668" cy="183298"/>
+          </a:xfrm>
+          <a:prstGeom prst="bentConnector3">
+            <a:avLst/>
+          </a:prstGeom>
+          <a:ln w="19050">
+            <a:solidFill>
+              <a:srgbClr val="7030A0"/>
+            </a:solidFill>
+            <a:headEnd type="none" w="med" len="med"/>
+            <a:tailEnd type="arrow" w="med" len="med"/>
+          </a:ln>
+          <a:effectLst/>
+        </p:spPr>
+        <p:style>
+          <a:lnRef idx="1">
+            <a:schemeClr val="accent2"/>
+          </a:lnRef>
+          <a:fillRef idx="2">
+            <a:schemeClr val="accent2"/>
+          </a:fillRef>
+          <a:effectRef idx="1">
+            <a:schemeClr val="accent2"/>
+          </a:effectRef>
+          <a:fontRef idx="minor">
+            <a:schemeClr val="dk1"/>
+          </a:fontRef>
+        </p:style>
+      </p:cxnSp>
+      <p:sp>
+        <p:nvSpPr>
+          <p:cNvPr id="54" name="Rectangle 8"/>
+          <p:cNvSpPr/>
+          <p:nvPr/>
+        </p:nvSpPr>
+        <p:spPr>
+          <a:xfrm>
+            <a:off x="7614983" y="3095452"/>
+            <a:ext cx="708186" cy="346760"/>
+          </a:xfrm>
+          <a:prstGeom prst="rect">
+            <a:avLst/>
+          </a:prstGeom>
           <a:ln w="19050">
             <a:solidFill>
               <a:srgbClr val="7030A0"/>
@@ -15209,9 +14652,17 @@
           <a:lstStyle/>
           <a:p>
             <a:pPr algn="ctr"/>
-            <a:endParaRPr lang="en-SG" sz="1050" b="1" dirty="0">
+            <a:r>
+              <a:rPr lang="en-US" sz="1050" smtClean="0">
+                <a:solidFill>
+                  <a:srgbClr val="7030A0"/>
+                </a:solidFill>
+              </a:rPr>
+              <a:t>AMDate</a:t>
+            </a:r>
+            <a:endParaRPr lang="en-SG" sz="1050" dirty="0">
               <a:solidFill>
-                <a:srgbClr val="92D050"/>
+                <a:srgbClr val="7030A0"/>
               </a:solidFill>
             </a:endParaRPr>
           </a:p>

</xml_diff>

<commit_message>
Update developer guide diagram
</commit_message>
<xml_diff>
--- a/docs/diagrams/Diagrams.pptx
+++ b/docs/diagrams/Diagrams.pptx
@@ -216,7 +216,7 @@
           <a:p>
             <a:fld id="{F5CC4B3F-88C1-4FFA-B1B6-F41C21DC6924}" type="datetimeFigureOut">
               <a:rPr lang="en-US" smtClean="0"/>
-              <a:t>11/5/16</a:t>
+              <a:t>11/7/16</a:t>
             </a:fld>
             <a:endParaRPr lang="en-US" dirty="0"/>
           </a:p>
@@ -665,7 +665,7 @@
           <a:p>
             <a:fld id="{78C97017-6FC3-485B-9764-EAC9E56C1D49}" type="datetimeFigureOut">
               <a:rPr lang="en-US" smtClean="0"/>
-              <a:t>11/5/16</a:t>
+              <a:t>11/7/16</a:t>
             </a:fld>
             <a:endParaRPr lang="en-US" dirty="0"/>
           </a:p>
@@ -835,7 +835,7 @@
           <a:p>
             <a:fld id="{78C97017-6FC3-485B-9764-EAC9E56C1D49}" type="datetimeFigureOut">
               <a:rPr lang="en-US" smtClean="0"/>
-              <a:t>11/5/16</a:t>
+              <a:t>11/7/16</a:t>
             </a:fld>
             <a:endParaRPr lang="en-US" dirty="0"/>
           </a:p>
@@ -1015,7 +1015,7 @@
           <a:p>
             <a:fld id="{78C97017-6FC3-485B-9764-EAC9E56C1D49}" type="datetimeFigureOut">
               <a:rPr lang="en-US" smtClean="0"/>
-              <a:t>11/5/16</a:t>
+              <a:t>11/7/16</a:t>
             </a:fld>
             <a:endParaRPr lang="en-US" dirty="0"/>
           </a:p>
@@ -1185,7 +1185,7 @@
           <a:p>
             <a:fld id="{78C97017-6FC3-485B-9764-EAC9E56C1D49}" type="datetimeFigureOut">
               <a:rPr lang="en-US" smtClean="0"/>
-              <a:t>11/5/16</a:t>
+              <a:t>11/7/16</a:t>
             </a:fld>
             <a:endParaRPr lang="en-US" dirty="0"/>
           </a:p>
@@ -1431,7 +1431,7 @@
           <a:p>
             <a:fld id="{78C97017-6FC3-485B-9764-EAC9E56C1D49}" type="datetimeFigureOut">
               <a:rPr lang="en-US" smtClean="0"/>
-              <a:t>11/5/16</a:t>
+              <a:t>11/7/16</a:t>
             </a:fld>
             <a:endParaRPr lang="en-US" dirty="0"/>
           </a:p>
@@ -1719,7 +1719,7 @@
           <a:p>
             <a:fld id="{78C97017-6FC3-485B-9764-EAC9E56C1D49}" type="datetimeFigureOut">
               <a:rPr lang="en-US" smtClean="0"/>
-              <a:t>11/5/16</a:t>
+              <a:t>11/7/16</a:t>
             </a:fld>
             <a:endParaRPr lang="en-US" dirty="0"/>
           </a:p>
@@ -2141,7 +2141,7 @@
           <a:p>
             <a:fld id="{78C97017-6FC3-485B-9764-EAC9E56C1D49}" type="datetimeFigureOut">
               <a:rPr lang="en-US" smtClean="0"/>
-              <a:t>11/5/16</a:t>
+              <a:t>11/7/16</a:t>
             </a:fld>
             <a:endParaRPr lang="en-US" dirty="0"/>
           </a:p>
@@ -2259,7 +2259,7 @@
           <a:p>
             <a:fld id="{78C97017-6FC3-485B-9764-EAC9E56C1D49}" type="datetimeFigureOut">
               <a:rPr lang="en-US" smtClean="0"/>
-              <a:t>11/5/16</a:t>
+              <a:t>11/7/16</a:t>
             </a:fld>
             <a:endParaRPr lang="en-US" dirty="0"/>
           </a:p>
@@ -2354,7 +2354,7 @@
           <a:p>
             <a:fld id="{78C97017-6FC3-485B-9764-EAC9E56C1D49}" type="datetimeFigureOut">
               <a:rPr lang="en-US" smtClean="0"/>
-              <a:t>11/5/16</a:t>
+              <a:t>11/7/16</a:t>
             </a:fld>
             <a:endParaRPr lang="en-US" dirty="0"/>
           </a:p>
@@ -2631,7 +2631,7 @@
           <a:p>
             <a:fld id="{78C97017-6FC3-485B-9764-EAC9E56C1D49}" type="datetimeFigureOut">
               <a:rPr lang="en-US" smtClean="0"/>
-              <a:t>11/5/16</a:t>
+              <a:t>11/7/16</a:t>
             </a:fld>
             <a:endParaRPr lang="en-US" dirty="0"/>
           </a:p>
@@ -2884,7 +2884,7 @@
           <a:p>
             <a:fld id="{78C97017-6FC3-485B-9764-EAC9E56C1D49}" type="datetimeFigureOut">
               <a:rPr lang="en-US" smtClean="0"/>
-              <a:t>11/5/16</a:t>
+              <a:t>11/7/16</a:t>
             </a:fld>
             <a:endParaRPr lang="en-US" dirty="0"/>
           </a:p>
@@ -3097,7 +3097,7 @@
           <a:p>
             <a:fld id="{78C97017-6FC3-485B-9764-EAC9E56C1D49}" type="datetimeFigureOut">
               <a:rPr lang="en-US" smtClean="0"/>
-              <a:t>11/5/16</a:t>
+              <a:t>11/7/16</a:t>
             </a:fld>
             <a:endParaRPr lang="en-US" dirty="0"/>
           </a:p>
@@ -7951,17 +7951,7 @@
                   </a:schemeClr>
                 </a:solidFill>
               </a:rPr>
-              <a:t>FloatingList</a:t>
-            </a:r>
-            <a:r>
-              <a:rPr lang="en-US" sz="1050" b="1" smtClean="0">
-                <a:solidFill>
-                  <a:schemeClr val="accent3">
-                    <a:lumMod val="75000"/>
-                  </a:schemeClr>
-                </a:solidFill>
-              </a:rPr>
-              <a:t>Panel</a:t>
+              <a:t>FloatingListPanel</a:t>
             </a:r>
             <a:endParaRPr lang="en-SG" sz="1050" b="1" dirty="0">
               <a:solidFill>
@@ -12786,7 +12776,7 @@
         </p:nvSpPr>
         <p:spPr>
           <a:xfrm>
-            <a:off x="4191000" y="2996259"/>
+            <a:off x="4153841" y="2968875"/>
             <a:ext cx="640023" cy="215444"/>
           </a:xfrm>
           <a:prstGeom prst="rect">
@@ -12827,8 +12817,8 @@
         </p:nvSpPr>
         <p:spPr>
           <a:xfrm>
-            <a:off x="2131905" y="2850922"/>
-            <a:ext cx="1424846" cy="215444"/>
+            <a:off x="1739276" y="2776630"/>
+            <a:ext cx="2129785" cy="215444"/>
           </a:xfrm>
           <a:prstGeom prst="rect">
             <a:avLst/>
@@ -12853,8 +12843,16 @@
           </a:lstStyle>
           <a:p>
             <a:r>
+              <a:rPr lang="en-US" smtClean="0"/>
+              <a:t>parseCommand</a:t>
+            </a:r>
+            <a:r>
               <a:rPr lang="en-US" dirty="0" smtClean="0"/>
-              <a:t>parse(“delete 1”)</a:t>
+              <a:t>(“</a:t>
+            </a:r>
+            <a:r>
+              <a:rPr lang="en-US" dirty="0" smtClean="0"/>
+              <a:t>delete 1”)</a:t>
             </a:r>
             <a:endParaRPr lang="en-US" dirty="0"/>
           </a:p>

</xml_diff>